<commit_message>
Add ARC movement style for enemy
</commit_message>
<xml_diff>
--- a/Document/GAME_DOC.pptx
+++ b/Document/GAME_DOC.pptx
@@ -13,6 +13,11 @@
     <p:sldId id="261" r:id="rId7"/>
     <p:sldId id="262" r:id="rId8"/>
     <p:sldId id="263" r:id="rId9"/>
+    <p:sldId id="264" r:id="rId10"/>
+    <p:sldId id="266" r:id="rId11"/>
+    <p:sldId id="267" r:id="rId12"/>
+    <p:sldId id="265" r:id="rId13"/>
+    <p:sldId id="268" r:id="rId14"/>
   </p:sldIdLst>
   <p:sldSz cx="12192000" cy="6858000"/>
   <p:notesSz cx="6858000" cy="9144000"/>
@@ -112,6 +117,31 @@
     </a:lvl9pPr>
   </p:defaultTextStyle>
   <p:extLst>
+    <p:ext uri="{521415D9-36F7-43E2-AB2F-B90AF26B5E84}">
+      <p14:sectionLst xmlns:p14="http://schemas.microsoft.com/office/powerpoint/2010/main">
+        <p14:section name="Default Section" id="{4510182E-C326-43D7-A8FC-455AF8165963}">
+          <p14:sldIdLst>
+            <p14:sldId id="256"/>
+            <p14:sldId id="257"/>
+            <p14:sldId id="259"/>
+            <p14:sldId id="258"/>
+            <p14:sldId id="260"/>
+            <p14:sldId id="261"/>
+            <p14:sldId id="262"/>
+            <p14:sldId id="263"/>
+          </p14:sldIdLst>
+        </p14:section>
+        <p14:section name="ADD NEW CHARACTER" id="{19BCA68D-AE2A-4C94-8255-7B32ACA3EEAF}">
+          <p14:sldIdLst>
+            <p14:sldId id="264"/>
+            <p14:sldId id="266"/>
+            <p14:sldId id="267"/>
+            <p14:sldId id="265"/>
+            <p14:sldId id="268"/>
+          </p14:sldIdLst>
+        </p14:section>
+      </p14:sectionLst>
+    </p:ext>
     <p:ext uri="{EFAFB233-063F-42B5-8137-9DF3F51BA10A}">
       <p15:sldGuideLst xmlns:p15="http://schemas.microsoft.com/office/powerpoint/2012/main"/>
     </p:ext>
@@ -268,7 +298,7 @@
           <a:p>
             <a:fld id="{3278D0F3-B4A0-4219-ACCF-63413A3734F4}" type="datetimeFigureOut">
               <a:rPr lang="en-GB" smtClean="0"/>
-              <a:t>15/12/2024</a:t>
+              <a:t>21/12/2024</a:t>
             </a:fld>
             <a:endParaRPr lang="en-GB"/>
           </a:p>
@@ -468,7 +498,7 @@
           <a:p>
             <a:fld id="{3278D0F3-B4A0-4219-ACCF-63413A3734F4}" type="datetimeFigureOut">
               <a:rPr lang="en-GB" smtClean="0"/>
-              <a:t>15/12/2024</a:t>
+              <a:t>21/12/2024</a:t>
             </a:fld>
             <a:endParaRPr lang="en-GB"/>
           </a:p>
@@ -678,7 +708,7 @@
           <a:p>
             <a:fld id="{3278D0F3-B4A0-4219-ACCF-63413A3734F4}" type="datetimeFigureOut">
               <a:rPr lang="en-GB" smtClean="0"/>
-              <a:t>15/12/2024</a:t>
+              <a:t>21/12/2024</a:t>
             </a:fld>
             <a:endParaRPr lang="en-GB"/>
           </a:p>
@@ -878,7 +908,7 @@
           <a:p>
             <a:fld id="{3278D0F3-B4A0-4219-ACCF-63413A3734F4}" type="datetimeFigureOut">
               <a:rPr lang="en-GB" smtClean="0"/>
-              <a:t>15/12/2024</a:t>
+              <a:t>21/12/2024</a:t>
             </a:fld>
             <a:endParaRPr lang="en-GB"/>
           </a:p>
@@ -1154,7 +1184,7 @@
           <a:p>
             <a:fld id="{3278D0F3-B4A0-4219-ACCF-63413A3734F4}" type="datetimeFigureOut">
               <a:rPr lang="en-GB" smtClean="0"/>
-              <a:t>15/12/2024</a:t>
+              <a:t>21/12/2024</a:t>
             </a:fld>
             <a:endParaRPr lang="en-GB"/>
           </a:p>
@@ -1422,7 +1452,7 @@
           <a:p>
             <a:fld id="{3278D0F3-B4A0-4219-ACCF-63413A3734F4}" type="datetimeFigureOut">
               <a:rPr lang="en-GB" smtClean="0"/>
-              <a:t>15/12/2024</a:t>
+              <a:t>21/12/2024</a:t>
             </a:fld>
             <a:endParaRPr lang="en-GB"/>
           </a:p>
@@ -1837,7 +1867,7 @@
           <a:p>
             <a:fld id="{3278D0F3-B4A0-4219-ACCF-63413A3734F4}" type="datetimeFigureOut">
               <a:rPr lang="en-GB" smtClean="0"/>
-              <a:t>15/12/2024</a:t>
+              <a:t>21/12/2024</a:t>
             </a:fld>
             <a:endParaRPr lang="en-GB"/>
           </a:p>
@@ -1979,7 +2009,7 @@
           <a:p>
             <a:fld id="{3278D0F3-B4A0-4219-ACCF-63413A3734F4}" type="datetimeFigureOut">
               <a:rPr lang="en-GB" smtClean="0"/>
-              <a:t>15/12/2024</a:t>
+              <a:t>21/12/2024</a:t>
             </a:fld>
             <a:endParaRPr lang="en-GB"/>
           </a:p>
@@ -2092,7 +2122,7 @@
           <a:p>
             <a:fld id="{3278D0F3-B4A0-4219-ACCF-63413A3734F4}" type="datetimeFigureOut">
               <a:rPr lang="en-GB" smtClean="0"/>
-              <a:t>15/12/2024</a:t>
+              <a:t>21/12/2024</a:t>
             </a:fld>
             <a:endParaRPr lang="en-GB"/>
           </a:p>
@@ -2405,7 +2435,7 @@
           <a:p>
             <a:fld id="{3278D0F3-B4A0-4219-ACCF-63413A3734F4}" type="datetimeFigureOut">
               <a:rPr lang="en-GB" smtClean="0"/>
-              <a:t>15/12/2024</a:t>
+              <a:t>21/12/2024</a:t>
             </a:fld>
             <a:endParaRPr lang="en-GB"/>
           </a:p>
@@ -2694,7 +2724,7 @@
           <a:p>
             <a:fld id="{3278D0F3-B4A0-4219-ACCF-63413A3734F4}" type="datetimeFigureOut">
               <a:rPr lang="en-GB" smtClean="0"/>
-              <a:t>15/12/2024</a:t>
+              <a:t>21/12/2024</a:t>
             </a:fld>
             <a:endParaRPr lang="en-GB"/>
           </a:p>
@@ -2937,7 +2967,7 @@
           <a:p>
             <a:fld id="{3278D0F3-B4A0-4219-ACCF-63413A3734F4}" type="datetimeFigureOut">
               <a:rPr lang="en-GB" smtClean="0"/>
-              <a:t>15/12/2024</a:t>
+              <a:t>21/12/2024</a:t>
             </a:fld>
             <a:endParaRPr lang="en-GB"/>
           </a:p>
@@ -3995,6 +4025,911 @@
     <p:extLst>
       <p:ext uri="{BB962C8B-B14F-4D97-AF65-F5344CB8AC3E}">
         <p14:creationId xmlns:p14="http://schemas.microsoft.com/office/powerpoint/2010/main" val="595196426"/>
+      </p:ext>
+    </p:extLst>
+  </p:cSld>
+  <p:clrMapOvr>
+    <a:masterClrMapping/>
+  </p:clrMapOvr>
+</p:sld>
+</file>
+
+<file path=ppt/slides/slide10.xml><?xml version="1.0" encoding="utf-8"?>
+<p:sld xmlns:a="http://schemas.openxmlformats.org/drawingml/2006/main" xmlns:r="http://schemas.openxmlformats.org/officeDocument/2006/relationships" xmlns:p="http://schemas.openxmlformats.org/presentationml/2006/main">
+  <p:cSld>
+    <p:spTree>
+      <p:nvGrpSpPr>
+        <p:cNvPr id="1" name=""/>
+        <p:cNvGrpSpPr/>
+        <p:nvPr/>
+      </p:nvGrpSpPr>
+      <p:grpSpPr>
+        <a:xfrm>
+          <a:off x="0" y="0"/>
+          <a:ext cx="0" cy="0"/>
+          <a:chOff x="0" y="0"/>
+          <a:chExt cx="0" cy="0"/>
+        </a:xfrm>
+      </p:grpSpPr>
+      <p:sp>
+        <p:nvSpPr>
+          <p:cNvPr id="6" name="TextBox 5">
+            <a:extLst>
+              <a:ext uri="{FF2B5EF4-FFF2-40B4-BE49-F238E27FC236}">
+                <a16:creationId xmlns:a16="http://schemas.microsoft.com/office/drawing/2014/main" id="{5BEED84C-D443-EFB7-16C6-7A59AE681944}"/>
+              </a:ext>
+            </a:extLst>
+          </p:cNvPr>
+          <p:cNvSpPr txBox="1"/>
+          <p:nvPr/>
+        </p:nvSpPr>
+        <p:spPr>
+          <a:xfrm>
+            <a:off x="244259" y="10140"/>
+            <a:ext cx="4968861" cy="369332"/>
+          </a:xfrm>
+          <a:prstGeom prst="rect">
+            <a:avLst/>
+          </a:prstGeom>
+          <a:noFill/>
+        </p:spPr>
+        <p:txBody>
+          <a:bodyPr wrap="none" rtlCol="0">
+            <a:spAutoFit/>
+          </a:bodyPr>
+          <a:lstStyle/>
+          <a:p>
+            <a:r>
+              <a:rPr lang="en-GB" dirty="0"/>
+              <a:t>2/ In </a:t>
+            </a:r>
+            <a:r>
+              <a:rPr lang="en-GB" b="1" dirty="0"/>
+              <a:t>Constructor of class Character</a:t>
+            </a:r>
+            <a:r>
+              <a:rPr lang="en-GB" dirty="0"/>
+              <a:t> in </a:t>
+            </a:r>
+            <a:r>
+              <a:rPr lang="en-GB" b="1" dirty="0"/>
+              <a:t>Character.js </a:t>
+            </a:r>
+          </a:p>
+        </p:txBody>
+      </p:sp>
+      <p:sp>
+        <p:nvSpPr>
+          <p:cNvPr id="9" name="TextBox 8">
+            <a:extLst>
+              <a:ext uri="{FF2B5EF4-FFF2-40B4-BE49-F238E27FC236}">
+                <a16:creationId xmlns:a16="http://schemas.microsoft.com/office/drawing/2014/main" id="{6D0571E9-4991-00AD-CC38-3F6169B346ED}"/>
+              </a:ext>
+            </a:extLst>
+          </p:cNvPr>
+          <p:cNvSpPr txBox="1"/>
+          <p:nvPr/>
+        </p:nvSpPr>
+        <p:spPr>
+          <a:xfrm>
+            <a:off x="5715911" y="0"/>
+            <a:ext cx="5277727" cy="369332"/>
+          </a:xfrm>
+          <a:prstGeom prst="rect">
+            <a:avLst/>
+          </a:prstGeom>
+          <a:noFill/>
+        </p:spPr>
+        <p:txBody>
+          <a:bodyPr wrap="none" rtlCol="0">
+            <a:spAutoFit/>
+          </a:bodyPr>
+          <a:lstStyle/>
+          <a:p>
+            <a:r>
+              <a:rPr lang="en-GB" dirty="0"/>
+              <a:t>3/ In </a:t>
+            </a:r>
+            <a:r>
+              <a:rPr lang="en-GB" b="1" dirty="0" err="1"/>
+              <a:t>setAnimation</a:t>
+            </a:r>
+            <a:r>
+              <a:rPr lang="en-GB" b="1" dirty="0"/>
+              <a:t>() of class Character </a:t>
+            </a:r>
+            <a:r>
+              <a:rPr lang="en-GB" dirty="0"/>
+              <a:t>in </a:t>
+            </a:r>
+            <a:r>
+              <a:rPr lang="en-GB" b="1" dirty="0"/>
+              <a:t>Character.js </a:t>
+            </a:r>
+          </a:p>
+        </p:txBody>
+      </p:sp>
+      <p:grpSp>
+        <p:nvGrpSpPr>
+          <p:cNvPr id="12" name="Group 11">
+            <a:extLst>
+              <a:ext uri="{FF2B5EF4-FFF2-40B4-BE49-F238E27FC236}">
+                <a16:creationId xmlns:a16="http://schemas.microsoft.com/office/drawing/2014/main" id="{4EC9CF13-6B6A-8AC6-0177-CEBFACD27004}"/>
+              </a:ext>
+            </a:extLst>
+          </p:cNvPr>
+          <p:cNvGrpSpPr/>
+          <p:nvPr/>
+        </p:nvGrpSpPr>
+        <p:grpSpPr>
+          <a:xfrm>
+            <a:off x="841273" y="719137"/>
+            <a:ext cx="4000500" cy="5419725"/>
+            <a:chOff x="841273" y="719137"/>
+            <a:chExt cx="4000500" cy="5419725"/>
+          </a:xfrm>
+        </p:grpSpPr>
+        <p:pic>
+          <p:nvPicPr>
+            <p:cNvPr id="5" name="Picture 4">
+              <a:extLst>
+                <a:ext uri="{FF2B5EF4-FFF2-40B4-BE49-F238E27FC236}">
+                  <a16:creationId xmlns:a16="http://schemas.microsoft.com/office/drawing/2014/main" id="{4E55C411-7763-283A-2D07-1A87902BA497}"/>
+                </a:ext>
+              </a:extLst>
+            </p:cNvPr>
+            <p:cNvPicPr>
+              <a:picLocks noChangeAspect="1"/>
+            </p:cNvPicPr>
+            <p:nvPr/>
+          </p:nvPicPr>
+          <p:blipFill>
+            <a:blip r:embed="rId2"/>
+            <a:stretch>
+              <a:fillRect/>
+            </a:stretch>
+          </p:blipFill>
+          <p:spPr>
+            <a:xfrm>
+              <a:off x="841273" y="719137"/>
+              <a:ext cx="4000500" cy="5419725"/>
+            </a:xfrm>
+            <a:prstGeom prst="rect">
+              <a:avLst/>
+            </a:prstGeom>
+          </p:spPr>
+        </p:pic>
+        <p:sp>
+          <p:nvSpPr>
+            <p:cNvPr id="10" name="Rectangle 9">
+              <a:extLst>
+                <a:ext uri="{FF2B5EF4-FFF2-40B4-BE49-F238E27FC236}">
+                  <a16:creationId xmlns:a16="http://schemas.microsoft.com/office/drawing/2014/main" id="{1C75831E-62D8-32BF-8D58-380C06AB2343}"/>
+                </a:ext>
+              </a:extLst>
+            </p:cNvPr>
+            <p:cNvSpPr/>
+            <p:nvPr/>
+          </p:nvSpPr>
+          <p:spPr>
+            <a:xfrm>
+              <a:off x="1141299" y="4139381"/>
+              <a:ext cx="3302882" cy="1622322"/>
+            </a:xfrm>
+            <a:prstGeom prst="rect">
+              <a:avLst/>
+            </a:prstGeom>
+            <a:noFill/>
+            <a:ln w="28575">
+              <a:solidFill>
+                <a:srgbClr val="FF0000"/>
+              </a:solidFill>
+            </a:ln>
+          </p:spPr>
+          <p:style>
+            <a:lnRef idx="2">
+              <a:schemeClr val="accent1">
+                <a:shade val="15000"/>
+              </a:schemeClr>
+            </a:lnRef>
+            <a:fillRef idx="1">
+              <a:schemeClr val="accent1"/>
+            </a:fillRef>
+            <a:effectRef idx="0">
+              <a:schemeClr val="accent1"/>
+            </a:effectRef>
+            <a:fontRef idx="minor">
+              <a:schemeClr val="lt1"/>
+            </a:fontRef>
+          </p:style>
+          <p:txBody>
+            <a:bodyPr rtlCol="0" anchor="ctr"/>
+            <a:lstStyle/>
+            <a:p>
+              <a:pPr algn="ctr"/>
+              <a:endParaRPr lang="en-GB" dirty="0"/>
+            </a:p>
+          </p:txBody>
+        </p:sp>
+      </p:grpSp>
+      <p:grpSp>
+        <p:nvGrpSpPr>
+          <p:cNvPr id="13" name="Group 12">
+            <a:extLst>
+              <a:ext uri="{FF2B5EF4-FFF2-40B4-BE49-F238E27FC236}">
+                <a16:creationId xmlns:a16="http://schemas.microsoft.com/office/drawing/2014/main" id="{81E6A1EC-265E-3E84-3DCE-D60B065AF519}"/>
+              </a:ext>
+            </a:extLst>
+          </p:cNvPr>
+          <p:cNvGrpSpPr/>
+          <p:nvPr/>
+        </p:nvGrpSpPr>
+        <p:grpSpPr>
+          <a:xfrm>
+            <a:off x="5830837" y="516654"/>
+            <a:ext cx="6115050" cy="3228975"/>
+            <a:chOff x="5830837" y="516654"/>
+            <a:chExt cx="6115050" cy="3228975"/>
+          </a:xfrm>
+        </p:grpSpPr>
+        <p:pic>
+          <p:nvPicPr>
+            <p:cNvPr id="8" name="Picture 7">
+              <a:extLst>
+                <a:ext uri="{FF2B5EF4-FFF2-40B4-BE49-F238E27FC236}">
+                  <a16:creationId xmlns:a16="http://schemas.microsoft.com/office/drawing/2014/main" id="{D9A40A0A-FEBA-1B27-B2B2-A481EE01E5E9}"/>
+                </a:ext>
+              </a:extLst>
+            </p:cNvPr>
+            <p:cNvPicPr>
+              <a:picLocks noChangeAspect="1"/>
+            </p:cNvPicPr>
+            <p:nvPr/>
+          </p:nvPicPr>
+          <p:blipFill>
+            <a:blip r:embed="rId3"/>
+            <a:stretch>
+              <a:fillRect/>
+            </a:stretch>
+          </p:blipFill>
+          <p:spPr>
+            <a:xfrm>
+              <a:off x="5830837" y="516654"/>
+              <a:ext cx="6115050" cy="3228975"/>
+            </a:xfrm>
+            <a:prstGeom prst="rect">
+              <a:avLst/>
+            </a:prstGeom>
+          </p:spPr>
+        </p:pic>
+        <p:sp>
+          <p:nvSpPr>
+            <p:cNvPr id="11" name="Rectangle 10">
+              <a:extLst>
+                <a:ext uri="{FF2B5EF4-FFF2-40B4-BE49-F238E27FC236}">
+                  <a16:creationId xmlns:a16="http://schemas.microsoft.com/office/drawing/2014/main" id="{0214AA2A-09D7-79A3-2158-2DBDA93E5241}"/>
+                </a:ext>
+              </a:extLst>
+            </p:cNvPr>
+            <p:cNvSpPr/>
+            <p:nvPr/>
+          </p:nvSpPr>
+          <p:spPr>
+            <a:xfrm>
+              <a:off x="6548284" y="2418735"/>
+              <a:ext cx="4975122" cy="806246"/>
+            </a:xfrm>
+            <a:prstGeom prst="rect">
+              <a:avLst/>
+            </a:prstGeom>
+            <a:noFill/>
+            <a:ln w="28575">
+              <a:solidFill>
+                <a:srgbClr val="FF0000"/>
+              </a:solidFill>
+            </a:ln>
+          </p:spPr>
+          <p:style>
+            <a:lnRef idx="2">
+              <a:schemeClr val="accent1">
+                <a:shade val="15000"/>
+              </a:schemeClr>
+            </a:lnRef>
+            <a:fillRef idx="1">
+              <a:schemeClr val="accent1"/>
+            </a:fillRef>
+            <a:effectRef idx="0">
+              <a:schemeClr val="accent1"/>
+            </a:effectRef>
+            <a:fontRef idx="minor">
+              <a:schemeClr val="lt1"/>
+            </a:fontRef>
+          </p:style>
+          <p:txBody>
+            <a:bodyPr rtlCol="0" anchor="ctr"/>
+            <a:lstStyle/>
+            <a:p>
+              <a:pPr algn="ctr"/>
+              <a:endParaRPr lang="en-GB" dirty="0"/>
+            </a:p>
+          </p:txBody>
+        </p:sp>
+      </p:grpSp>
+    </p:spTree>
+    <p:extLst>
+      <p:ext uri="{BB962C8B-B14F-4D97-AF65-F5344CB8AC3E}">
+        <p14:creationId xmlns:p14="http://schemas.microsoft.com/office/powerpoint/2010/main" val="2339866532"/>
+      </p:ext>
+    </p:extLst>
+  </p:cSld>
+  <p:clrMapOvr>
+    <a:masterClrMapping/>
+  </p:clrMapOvr>
+</p:sld>
+</file>
+
+<file path=ppt/slides/slide11.xml><?xml version="1.0" encoding="utf-8"?>
+<p:sld xmlns:a="http://schemas.openxmlformats.org/drawingml/2006/main" xmlns:r="http://schemas.openxmlformats.org/officeDocument/2006/relationships" xmlns:p="http://schemas.openxmlformats.org/presentationml/2006/main">
+  <p:cSld>
+    <p:spTree>
+      <p:nvGrpSpPr>
+        <p:cNvPr id="1" name=""/>
+        <p:cNvGrpSpPr/>
+        <p:nvPr/>
+      </p:nvGrpSpPr>
+      <p:grpSpPr>
+        <a:xfrm>
+          <a:off x="0" y="0"/>
+          <a:ext cx="0" cy="0"/>
+          <a:chOff x="0" y="0"/>
+          <a:chExt cx="0" cy="0"/>
+        </a:xfrm>
+      </p:grpSpPr>
+      <p:sp>
+        <p:nvSpPr>
+          <p:cNvPr id="4" name="TextBox 3">
+            <a:extLst>
+              <a:ext uri="{FF2B5EF4-FFF2-40B4-BE49-F238E27FC236}">
+                <a16:creationId xmlns:a16="http://schemas.microsoft.com/office/drawing/2014/main" id="{E7EEE925-D5FE-ECE5-2C70-ECF43D2428A3}"/>
+              </a:ext>
+            </a:extLst>
+          </p:cNvPr>
+          <p:cNvSpPr txBox="1"/>
+          <p:nvPr/>
+        </p:nvSpPr>
+        <p:spPr>
+          <a:xfrm>
+            <a:off x="244259" y="10140"/>
+            <a:ext cx="4707379" cy="369332"/>
+          </a:xfrm>
+          <a:prstGeom prst="rect">
+            <a:avLst/>
+          </a:prstGeom>
+          <a:noFill/>
+        </p:spPr>
+        <p:txBody>
+          <a:bodyPr wrap="none" rtlCol="0">
+            <a:spAutoFit/>
+          </a:bodyPr>
+          <a:lstStyle/>
+          <a:p>
+            <a:r>
+              <a:rPr lang="en-GB" dirty="0"/>
+              <a:t>4/ In</a:t>
+            </a:r>
+            <a:r>
+              <a:rPr lang="en-GB" b="1" dirty="0"/>
+              <a:t>  update() of class Projectile  </a:t>
+            </a:r>
+            <a:r>
+              <a:rPr lang="en-GB" dirty="0"/>
+              <a:t>in </a:t>
+            </a:r>
+            <a:r>
+              <a:rPr lang="en-GB" b="1" dirty="0"/>
+              <a:t>Projectile.js</a:t>
+            </a:r>
+          </a:p>
+        </p:txBody>
+      </p:sp>
+      <p:grpSp>
+        <p:nvGrpSpPr>
+          <p:cNvPr id="9" name="Group 8">
+            <a:extLst>
+              <a:ext uri="{FF2B5EF4-FFF2-40B4-BE49-F238E27FC236}">
+                <a16:creationId xmlns:a16="http://schemas.microsoft.com/office/drawing/2014/main" id="{E8382C02-C2BA-CCFF-C7CA-2906D5854915}"/>
+              </a:ext>
+            </a:extLst>
+          </p:cNvPr>
+          <p:cNvGrpSpPr/>
+          <p:nvPr/>
+        </p:nvGrpSpPr>
+        <p:grpSpPr>
+          <a:xfrm>
+            <a:off x="2093656" y="543692"/>
+            <a:ext cx="6667500" cy="4905375"/>
+            <a:chOff x="2093656" y="543692"/>
+            <a:chExt cx="6667500" cy="4905375"/>
+          </a:xfrm>
+        </p:grpSpPr>
+        <p:pic>
+          <p:nvPicPr>
+            <p:cNvPr id="6" name="Picture 5">
+              <a:extLst>
+                <a:ext uri="{FF2B5EF4-FFF2-40B4-BE49-F238E27FC236}">
+                  <a16:creationId xmlns:a16="http://schemas.microsoft.com/office/drawing/2014/main" id="{F4BD1197-9243-CFD4-8AF5-EEE1F4393929}"/>
+                </a:ext>
+              </a:extLst>
+            </p:cNvPr>
+            <p:cNvPicPr>
+              <a:picLocks noChangeAspect="1"/>
+            </p:cNvPicPr>
+            <p:nvPr/>
+          </p:nvPicPr>
+          <p:blipFill>
+            <a:blip r:embed="rId2"/>
+            <a:stretch>
+              <a:fillRect/>
+            </a:stretch>
+          </p:blipFill>
+          <p:spPr>
+            <a:xfrm>
+              <a:off x="2093656" y="543692"/>
+              <a:ext cx="6667500" cy="4905375"/>
+            </a:xfrm>
+            <a:prstGeom prst="rect">
+              <a:avLst/>
+            </a:prstGeom>
+          </p:spPr>
+        </p:pic>
+        <p:sp>
+          <p:nvSpPr>
+            <p:cNvPr id="7" name="Rectangle 6">
+              <a:extLst>
+                <a:ext uri="{FF2B5EF4-FFF2-40B4-BE49-F238E27FC236}">
+                  <a16:creationId xmlns:a16="http://schemas.microsoft.com/office/drawing/2014/main" id="{56828C66-674C-A2EC-B48D-0FA951E52F12}"/>
+                </a:ext>
+              </a:extLst>
+            </p:cNvPr>
+            <p:cNvSpPr/>
+            <p:nvPr/>
+          </p:nvSpPr>
+          <p:spPr>
+            <a:xfrm>
+              <a:off x="2369574" y="3765755"/>
+              <a:ext cx="6027174" cy="1297858"/>
+            </a:xfrm>
+            <a:prstGeom prst="rect">
+              <a:avLst/>
+            </a:prstGeom>
+            <a:noFill/>
+            <a:ln w="28575">
+              <a:solidFill>
+                <a:srgbClr val="FF0000"/>
+              </a:solidFill>
+            </a:ln>
+          </p:spPr>
+          <p:style>
+            <a:lnRef idx="2">
+              <a:schemeClr val="accent1">
+                <a:shade val="15000"/>
+              </a:schemeClr>
+            </a:lnRef>
+            <a:fillRef idx="1">
+              <a:schemeClr val="accent1"/>
+            </a:fillRef>
+            <a:effectRef idx="0">
+              <a:schemeClr val="accent1"/>
+            </a:effectRef>
+            <a:fontRef idx="minor">
+              <a:schemeClr val="lt1"/>
+            </a:fontRef>
+          </p:style>
+          <p:txBody>
+            <a:bodyPr rtlCol="0" anchor="ctr"/>
+            <a:lstStyle/>
+            <a:p>
+              <a:pPr algn="ctr"/>
+              <a:endParaRPr lang="en-GB" dirty="0"/>
+            </a:p>
+          </p:txBody>
+        </p:sp>
+      </p:grpSp>
+    </p:spTree>
+    <p:extLst>
+      <p:ext uri="{BB962C8B-B14F-4D97-AF65-F5344CB8AC3E}">
+        <p14:creationId xmlns:p14="http://schemas.microsoft.com/office/powerpoint/2010/main" val="1392033015"/>
+      </p:ext>
+    </p:extLst>
+  </p:cSld>
+  <p:clrMapOvr>
+    <a:masterClrMapping/>
+  </p:clrMapOvr>
+</p:sld>
+</file>
+
+<file path=ppt/slides/slide12.xml><?xml version="1.0" encoding="utf-8"?>
+<p:sld xmlns:a="http://schemas.openxmlformats.org/drawingml/2006/main" xmlns:r="http://schemas.openxmlformats.org/officeDocument/2006/relationships" xmlns:p="http://schemas.openxmlformats.org/presentationml/2006/main">
+  <p:cSld>
+    <p:spTree>
+      <p:nvGrpSpPr>
+        <p:cNvPr id="1" name=""/>
+        <p:cNvGrpSpPr/>
+        <p:nvPr/>
+      </p:nvGrpSpPr>
+      <p:grpSpPr>
+        <a:xfrm>
+          <a:off x="0" y="0"/>
+          <a:ext cx="0" cy="0"/>
+          <a:chOff x="0" y="0"/>
+          <a:chExt cx="0" cy="0"/>
+        </a:xfrm>
+      </p:grpSpPr>
+      <p:sp>
+        <p:nvSpPr>
+          <p:cNvPr id="6" name="TextBox 5">
+            <a:extLst>
+              <a:ext uri="{FF2B5EF4-FFF2-40B4-BE49-F238E27FC236}">
+                <a16:creationId xmlns:a16="http://schemas.microsoft.com/office/drawing/2014/main" id="{5FCCD1BE-B4F9-370B-485A-2D9734FB10C1}"/>
+              </a:ext>
+            </a:extLst>
+          </p:cNvPr>
+          <p:cNvSpPr txBox="1"/>
+          <p:nvPr/>
+        </p:nvSpPr>
+        <p:spPr>
+          <a:xfrm>
+            <a:off x="244259" y="10140"/>
+            <a:ext cx="1788375" cy="369332"/>
+          </a:xfrm>
+          <a:prstGeom prst="rect">
+            <a:avLst/>
+          </a:prstGeom>
+          <a:noFill/>
+        </p:spPr>
+        <p:txBody>
+          <a:bodyPr wrap="none" rtlCol="0">
+            <a:spAutoFit/>
+          </a:bodyPr>
+          <a:lstStyle/>
+          <a:p>
+            <a:r>
+              <a:rPr lang="en-GB" dirty="0"/>
+              <a:t>5/ In </a:t>
+            </a:r>
+            <a:r>
+              <a:rPr lang="en-GB" b="1" dirty="0"/>
+              <a:t>Character.js</a:t>
+            </a:r>
+          </a:p>
+        </p:txBody>
+      </p:sp>
+      <p:grpSp>
+        <p:nvGrpSpPr>
+          <p:cNvPr id="10" name="Group 9">
+            <a:extLst>
+              <a:ext uri="{FF2B5EF4-FFF2-40B4-BE49-F238E27FC236}">
+                <a16:creationId xmlns:a16="http://schemas.microsoft.com/office/drawing/2014/main" id="{AA5E7FF1-87B7-7EAC-EF08-12F100338024}"/>
+              </a:ext>
+            </a:extLst>
+          </p:cNvPr>
+          <p:cNvGrpSpPr/>
+          <p:nvPr/>
+        </p:nvGrpSpPr>
+        <p:grpSpPr>
+          <a:xfrm>
+            <a:off x="809625" y="600075"/>
+            <a:ext cx="10572750" cy="5657850"/>
+            <a:chOff x="809625" y="600075"/>
+            <a:chExt cx="10572750" cy="5657850"/>
+          </a:xfrm>
+        </p:grpSpPr>
+        <p:pic>
+          <p:nvPicPr>
+            <p:cNvPr id="5" name="Picture 4">
+              <a:extLst>
+                <a:ext uri="{FF2B5EF4-FFF2-40B4-BE49-F238E27FC236}">
+                  <a16:creationId xmlns:a16="http://schemas.microsoft.com/office/drawing/2014/main" id="{2A7C9336-E2D7-B309-C4B9-07EF95F64B62}"/>
+                </a:ext>
+              </a:extLst>
+            </p:cNvPr>
+            <p:cNvPicPr>
+              <a:picLocks noChangeAspect="1"/>
+            </p:cNvPicPr>
+            <p:nvPr/>
+          </p:nvPicPr>
+          <p:blipFill>
+            <a:blip r:embed="rId2"/>
+            <a:stretch>
+              <a:fillRect/>
+            </a:stretch>
+          </p:blipFill>
+          <p:spPr>
+            <a:xfrm>
+              <a:off x="809625" y="600075"/>
+              <a:ext cx="10572750" cy="5657850"/>
+            </a:xfrm>
+            <a:prstGeom prst="rect">
+              <a:avLst/>
+            </a:prstGeom>
+          </p:spPr>
+        </p:pic>
+        <p:sp>
+          <p:nvSpPr>
+            <p:cNvPr id="12" name="Rectangle 11">
+              <a:extLst>
+                <a:ext uri="{FF2B5EF4-FFF2-40B4-BE49-F238E27FC236}">
+                  <a16:creationId xmlns:a16="http://schemas.microsoft.com/office/drawing/2014/main" id="{2992B324-5ECC-0840-7C2B-9C39D0F01402}"/>
+                </a:ext>
+              </a:extLst>
+            </p:cNvPr>
+            <p:cNvSpPr/>
+            <p:nvPr/>
+          </p:nvSpPr>
+          <p:spPr>
+            <a:xfrm>
+              <a:off x="1141299" y="4307429"/>
+              <a:ext cx="2732611" cy="1454274"/>
+            </a:xfrm>
+            <a:prstGeom prst="rect">
+              <a:avLst/>
+            </a:prstGeom>
+            <a:noFill/>
+            <a:ln w="28575">
+              <a:solidFill>
+                <a:srgbClr val="FF0000"/>
+              </a:solidFill>
+            </a:ln>
+          </p:spPr>
+          <p:style>
+            <a:lnRef idx="2">
+              <a:schemeClr val="accent1">
+                <a:shade val="15000"/>
+              </a:schemeClr>
+            </a:lnRef>
+            <a:fillRef idx="1">
+              <a:schemeClr val="accent1"/>
+            </a:fillRef>
+            <a:effectRef idx="0">
+              <a:schemeClr val="accent1"/>
+            </a:effectRef>
+            <a:fontRef idx="minor">
+              <a:schemeClr val="lt1"/>
+            </a:fontRef>
+          </p:style>
+          <p:txBody>
+            <a:bodyPr rtlCol="0" anchor="ctr"/>
+            <a:lstStyle/>
+            <a:p>
+              <a:pPr algn="ctr"/>
+              <a:endParaRPr lang="en-GB" dirty="0"/>
+            </a:p>
+          </p:txBody>
+        </p:sp>
+      </p:grpSp>
+    </p:spTree>
+    <p:extLst>
+      <p:ext uri="{BB962C8B-B14F-4D97-AF65-F5344CB8AC3E}">
+        <p14:creationId xmlns:p14="http://schemas.microsoft.com/office/powerpoint/2010/main" val="1376716173"/>
+      </p:ext>
+    </p:extLst>
+  </p:cSld>
+  <p:clrMapOvr>
+    <a:masterClrMapping/>
+  </p:clrMapOvr>
+</p:sld>
+</file>
+
+<file path=ppt/slides/slide13.xml><?xml version="1.0" encoding="utf-8"?>
+<p:sld xmlns:a="http://schemas.openxmlformats.org/drawingml/2006/main" xmlns:r="http://schemas.openxmlformats.org/officeDocument/2006/relationships" xmlns:p="http://schemas.openxmlformats.org/presentationml/2006/main">
+  <p:cSld>
+    <p:spTree>
+      <p:nvGrpSpPr>
+        <p:cNvPr id="1" name=""/>
+        <p:cNvGrpSpPr/>
+        <p:nvPr/>
+      </p:nvGrpSpPr>
+      <p:grpSpPr>
+        <a:xfrm>
+          <a:off x="0" y="0"/>
+          <a:ext cx="0" cy="0"/>
+          <a:chOff x="0" y="0"/>
+          <a:chExt cx="0" cy="0"/>
+        </a:xfrm>
+      </p:grpSpPr>
+      <p:sp>
+        <p:nvSpPr>
+          <p:cNvPr id="7" name="TextBox 6">
+            <a:extLst>
+              <a:ext uri="{FF2B5EF4-FFF2-40B4-BE49-F238E27FC236}">
+                <a16:creationId xmlns:a16="http://schemas.microsoft.com/office/drawing/2014/main" id="{78D119C1-3D82-10CD-1FEB-F9166F15616B}"/>
+              </a:ext>
+            </a:extLst>
+          </p:cNvPr>
+          <p:cNvSpPr txBox="1"/>
+          <p:nvPr/>
+        </p:nvSpPr>
+        <p:spPr>
+          <a:xfrm>
+            <a:off x="137651" y="0"/>
+            <a:ext cx="7697300" cy="923330"/>
+          </a:xfrm>
+          <a:prstGeom prst="rect">
+            <a:avLst/>
+          </a:prstGeom>
+          <a:noFill/>
+        </p:spPr>
+        <p:txBody>
+          <a:bodyPr wrap="none" rtlCol="0">
+            <a:spAutoFit/>
+          </a:bodyPr>
+          <a:lstStyle/>
+          <a:p>
+            <a:r>
+              <a:rPr lang="en-GB" dirty="0"/>
+              <a:t>6/ In </a:t>
+            </a:r>
+            <a:r>
+              <a:rPr lang="en-GB" b="1" dirty="0"/>
+              <a:t>EVENT HANDLING </a:t>
+            </a:r>
+            <a:r>
+              <a:rPr lang="en-GB" dirty="0"/>
+              <a:t>in </a:t>
+            </a:r>
+            <a:r>
+              <a:rPr lang="en-GB" b="1" dirty="0"/>
+              <a:t>animation.js</a:t>
+            </a:r>
+          </a:p>
+          <a:p>
+            <a:r>
+              <a:rPr lang="en-GB" b="1" dirty="0"/>
+              <a:t>You can change projectile object in </a:t>
+            </a:r>
+            <a:r>
+              <a:rPr kumimoji="0" lang="en-US" altLang="en-US" sz="1800" b="1" i="0" u="none" strike="noStrike" cap="none" normalizeH="0" baseline="0" dirty="0">
+                <a:ln>
+                  <a:noFill/>
+                </a:ln>
+                <a:effectLst/>
+                <a:ea typeface="JetBrains Mono"/>
+              </a:rPr>
+              <a:t>SET UP PROJECTILE OBJECTS in </a:t>
+            </a:r>
+            <a:r>
+              <a:rPr lang="en-GB" b="1" dirty="0"/>
+              <a:t>animation.js</a:t>
+            </a:r>
+            <a:r>
+              <a:rPr kumimoji="0" lang="en-US" altLang="en-US" sz="1800" b="1" i="0" u="none" strike="noStrike" cap="none" normalizeH="0" baseline="0" dirty="0">
+                <a:ln>
+                  <a:noFill/>
+                </a:ln>
+                <a:effectLst/>
+                <a:ea typeface="JetBrains Mono"/>
+              </a:rPr>
+              <a:t> </a:t>
+            </a:r>
+            <a:endParaRPr kumimoji="0" lang="en-US" altLang="en-US" sz="4400" b="1" i="0" u="none" strike="noStrike" cap="none" normalizeH="0" baseline="0" dirty="0">
+              <a:ln>
+                <a:noFill/>
+              </a:ln>
+              <a:effectLst/>
+            </a:endParaRPr>
+          </a:p>
+          <a:p>
+            <a:endParaRPr lang="en-GB" b="1" dirty="0"/>
+          </a:p>
+        </p:txBody>
+      </p:sp>
+      <p:grpSp>
+        <p:nvGrpSpPr>
+          <p:cNvPr id="13" name="Group 12">
+            <a:extLst>
+              <a:ext uri="{FF2B5EF4-FFF2-40B4-BE49-F238E27FC236}">
+                <a16:creationId xmlns:a16="http://schemas.microsoft.com/office/drawing/2014/main" id="{C6582446-E7FB-B23F-3621-0A6CA647CF7E}"/>
+              </a:ext>
+            </a:extLst>
+          </p:cNvPr>
+          <p:cNvGrpSpPr/>
+          <p:nvPr/>
+        </p:nvGrpSpPr>
+        <p:grpSpPr>
+          <a:xfrm>
+            <a:off x="1296783" y="1013337"/>
+            <a:ext cx="9382125" cy="4457700"/>
+            <a:chOff x="1552421" y="1632769"/>
+            <a:chExt cx="9382125" cy="4457700"/>
+          </a:xfrm>
+        </p:grpSpPr>
+        <p:pic>
+          <p:nvPicPr>
+            <p:cNvPr id="5" name="Picture 4">
+              <a:extLst>
+                <a:ext uri="{FF2B5EF4-FFF2-40B4-BE49-F238E27FC236}">
+                  <a16:creationId xmlns:a16="http://schemas.microsoft.com/office/drawing/2014/main" id="{4A6497CB-2429-7C41-F875-99BA883CFE24}"/>
+                </a:ext>
+              </a:extLst>
+            </p:cNvPr>
+            <p:cNvPicPr>
+              <a:picLocks noChangeAspect="1"/>
+            </p:cNvPicPr>
+            <p:nvPr/>
+          </p:nvPicPr>
+          <p:blipFill>
+            <a:blip r:embed="rId2"/>
+            <a:stretch>
+              <a:fillRect/>
+            </a:stretch>
+          </p:blipFill>
+          <p:spPr>
+            <a:xfrm>
+              <a:off x="1552421" y="1632769"/>
+              <a:ext cx="9382125" cy="4457700"/>
+            </a:xfrm>
+            <a:prstGeom prst="rect">
+              <a:avLst/>
+            </a:prstGeom>
+          </p:spPr>
+        </p:pic>
+        <p:sp>
+          <p:nvSpPr>
+            <p:cNvPr id="8" name="Rectangle 7">
+              <a:extLst>
+                <a:ext uri="{FF2B5EF4-FFF2-40B4-BE49-F238E27FC236}">
+                  <a16:creationId xmlns:a16="http://schemas.microsoft.com/office/drawing/2014/main" id="{5083EF98-8792-216D-A4B8-3220249C2BC9}"/>
+                </a:ext>
+              </a:extLst>
+            </p:cNvPr>
+            <p:cNvSpPr/>
+            <p:nvPr/>
+          </p:nvSpPr>
+          <p:spPr>
+            <a:xfrm>
+              <a:off x="2447630" y="4320663"/>
+              <a:ext cx="5387321" cy="904568"/>
+            </a:xfrm>
+            <a:prstGeom prst="rect">
+              <a:avLst/>
+            </a:prstGeom>
+            <a:noFill/>
+            <a:ln w="28575">
+              <a:solidFill>
+                <a:srgbClr val="FF0000"/>
+              </a:solidFill>
+            </a:ln>
+          </p:spPr>
+          <p:style>
+            <a:lnRef idx="2">
+              <a:schemeClr val="accent1">
+                <a:shade val="15000"/>
+              </a:schemeClr>
+            </a:lnRef>
+            <a:fillRef idx="1">
+              <a:schemeClr val="accent1"/>
+            </a:fillRef>
+            <a:effectRef idx="0">
+              <a:schemeClr val="accent1"/>
+            </a:effectRef>
+            <a:fontRef idx="minor">
+              <a:schemeClr val="lt1"/>
+            </a:fontRef>
+          </p:style>
+          <p:txBody>
+            <a:bodyPr rtlCol="0" anchor="ctr"/>
+            <a:lstStyle/>
+            <a:p>
+              <a:pPr algn="ctr"/>
+              <a:endParaRPr lang="en-GB" dirty="0"/>
+            </a:p>
+          </p:txBody>
+        </p:sp>
+      </p:grpSp>
+    </p:spTree>
+    <p:extLst>
+      <p:ext uri="{BB962C8B-B14F-4D97-AF65-F5344CB8AC3E}">
+        <p14:creationId xmlns:p14="http://schemas.microsoft.com/office/powerpoint/2010/main" val="4191377309"/>
       </p:ext>
     </p:extLst>
   </p:cSld>
@@ -10513,6 +11448,230 @@
 </p:sld>
 </file>
 
+<file path=ppt/slides/slide9.xml><?xml version="1.0" encoding="utf-8"?>
+<p:sld xmlns:a="http://schemas.openxmlformats.org/drawingml/2006/main" xmlns:r="http://schemas.openxmlformats.org/officeDocument/2006/relationships" xmlns:p="http://schemas.openxmlformats.org/presentationml/2006/main">
+  <p:cSld>
+    <p:spTree>
+      <p:nvGrpSpPr>
+        <p:cNvPr id="1" name=""/>
+        <p:cNvGrpSpPr/>
+        <p:nvPr/>
+      </p:nvGrpSpPr>
+      <p:grpSpPr>
+        <a:xfrm>
+          <a:off x="0" y="0"/>
+          <a:ext cx="0" cy="0"/>
+          <a:chOff x="0" y="0"/>
+          <a:chExt cx="0" cy="0"/>
+        </a:xfrm>
+      </p:grpSpPr>
+      <p:grpSp>
+        <p:nvGrpSpPr>
+          <p:cNvPr id="9" name="Group 8">
+            <a:extLst>
+              <a:ext uri="{FF2B5EF4-FFF2-40B4-BE49-F238E27FC236}">
+                <a16:creationId xmlns:a16="http://schemas.microsoft.com/office/drawing/2014/main" id="{3038AED9-0EEF-8728-8BEE-662B8885F6CA}"/>
+              </a:ext>
+            </a:extLst>
+          </p:cNvPr>
+          <p:cNvGrpSpPr/>
+          <p:nvPr/>
+        </p:nvGrpSpPr>
+        <p:grpSpPr>
+          <a:xfrm>
+            <a:off x="903020" y="763205"/>
+            <a:ext cx="8419507" cy="1509558"/>
+            <a:chOff x="1886246" y="604990"/>
+            <a:chExt cx="8419507" cy="1509558"/>
+          </a:xfrm>
+        </p:grpSpPr>
+        <p:pic>
+          <p:nvPicPr>
+            <p:cNvPr id="6" name="Picture 5">
+              <a:extLst>
+                <a:ext uri="{FF2B5EF4-FFF2-40B4-BE49-F238E27FC236}">
+                  <a16:creationId xmlns:a16="http://schemas.microsoft.com/office/drawing/2014/main" id="{F0459CB7-1BD4-436B-FDCC-D3255E652C8F}"/>
+                </a:ext>
+              </a:extLst>
+            </p:cNvPr>
+            <p:cNvPicPr>
+              <a:picLocks noChangeAspect="1"/>
+            </p:cNvPicPr>
+            <p:nvPr/>
+          </p:nvPicPr>
+          <p:blipFill>
+            <a:blip r:embed="rId2"/>
+            <a:stretch>
+              <a:fillRect/>
+            </a:stretch>
+          </p:blipFill>
+          <p:spPr>
+            <a:xfrm>
+              <a:off x="1886246" y="604990"/>
+              <a:ext cx="8419507" cy="1509558"/>
+            </a:xfrm>
+            <a:prstGeom prst="rect">
+              <a:avLst/>
+            </a:prstGeom>
+          </p:spPr>
+        </p:pic>
+        <p:sp>
+          <p:nvSpPr>
+            <p:cNvPr id="7" name="Rectangle 6">
+              <a:extLst>
+                <a:ext uri="{FF2B5EF4-FFF2-40B4-BE49-F238E27FC236}">
+                  <a16:creationId xmlns:a16="http://schemas.microsoft.com/office/drawing/2014/main" id="{A3911FAD-B4B9-F77A-E43F-E340B1C03A58}"/>
+                </a:ext>
+              </a:extLst>
+            </p:cNvPr>
+            <p:cNvSpPr/>
+            <p:nvPr/>
+          </p:nvSpPr>
+          <p:spPr>
+            <a:xfrm>
+              <a:off x="1886246" y="1238865"/>
+              <a:ext cx="6913625" cy="285135"/>
+            </a:xfrm>
+            <a:prstGeom prst="rect">
+              <a:avLst/>
+            </a:prstGeom>
+            <a:noFill/>
+            <a:ln w="28575">
+              <a:solidFill>
+                <a:srgbClr val="FF0000"/>
+              </a:solidFill>
+            </a:ln>
+          </p:spPr>
+          <p:style>
+            <a:lnRef idx="2">
+              <a:schemeClr val="accent1">
+                <a:shade val="15000"/>
+              </a:schemeClr>
+            </a:lnRef>
+            <a:fillRef idx="1">
+              <a:schemeClr val="accent1"/>
+            </a:fillRef>
+            <a:effectRef idx="0">
+              <a:schemeClr val="accent1"/>
+            </a:effectRef>
+            <a:fontRef idx="minor">
+              <a:schemeClr val="lt1"/>
+            </a:fontRef>
+          </p:style>
+          <p:txBody>
+            <a:bodyPr rtlCol="0" anchor="ctr"/>
+            <a:lstStyle/>
+            <a:p>
+              <a:pPr algn="ctr"/>
+              <a:endParaRPr lang="en-GB" dirty="0"/>
+            </a:p>
+          </p:txBody>
+        </p:sp>
+        <p:sp>
+          <p:nvSpPr>
+            <p:cNvPr id="8" name="Rectangle 7">
+              <a:extLst>
+                <a:ext uri="{FF2B5EF4-FFF2-40B4-BE49-F238E27FC236}">
+                  <a16:creationId xmlns:a16="http://schemas.microsoft.com/office/drawing/2014/main" id="{A42F8A51-FA2D-44D9-4090-F5F7937EC875}"/>
+                </a:ext>
+              </a:extLst>
+            </p:cNvPr>
+            <p:cNvSpPr/>
+            <p:nvPr/>
+          </p:nvSpPr>
+          <p:spPr>
+            <a:xfrm>
+              <a:off x="8799871" y="1524000"/>
+              <a:ext cx="1415846" cy="351736"/>
+            </a:xfrm>
+            <a:prstGeom prst="rect">
+              <a:avLst/>
+            </a:prstGeom>
+            <a:noFill/>
+            <a:ln w="28575">
+              <a:solidFill>
+                <a:srgbClr val="FF0000"/>
+              </a:solidFill>
+            </a:ln>
+          </p:spPr>
+          <p:style>
+            <a:lnRef idx="2">
+              <a:schemeClr val="accent1">
+                <a:shade val="15000"/>
+              </a:schemeClr>
+            </a:lnRef>
+            <a:fillRef idx="1">
+              <a:schemeClr val="accent1"/>
+            </a:fillRef>
+            <a:effectRef idx="0">
+              <a:schemeClr val="accent1"/>
+            </a:effectRef>
+            <a:fontRef idx="minor">
+              <a:schemeClr val="lt1"/>
+            </a:fontRef>
+          </p:style>
+          <p:txBody>
+            <a:bodyPr rtlCol="0" anchor="ctr"/>
+            <a:lstStyle/>
+            <a:p>
+              <a:pPr algn="ctr"/>
+              <a:endParaRPr lang="en-GB"/>
+            </a:p>
+          </p:txBody>
+        </p:sp>
+      </p:grpSp>
+      <p:sp>
+        <p:nvSpPr>
+          <p:cNvPr id="10" name="TextBox 9">
+            <a:extLst>
+              <a:ext uri="{FF2B5EF4-FFF2-40B4-BE49-F238E27FC236}">
+                <a16:creationId xmlns:a16="http://schemas.microsoft.com/office/drawing/2014/main" id="{E7F96EBC-4AC8-FCAC-BD92-26C51B4583DA}"/>
+              </a:ext>
+            </a:extLst>
+          </p:cNvPr>
+          <p:cNvSpPr txBox="1"/>
+          <p:nvPr/>
+        </p:nvSpPr>
+        <p:spPr>
+          <a:xfrm>
+            <a:off x="195097" y="233798"/>
+            <a:ext cx="3587457" cy="369332"/>
+          </a:xfrm>
+          <a:prstGeom prst="rect">
+            <a:avLst/>
+          </a:prstGeom>
+          <a:noFill/>
+        </p:spPr>
+        <p:txBody>
+          <a:bodyPr wrap="none" rtlCol="0">
+            <a:spAutoFit/>
+          </a:bodyPr>
+          <a:lstStyle/>
+          <a:p>
+            <a:r>
+              <a:rPr lang="en-GB" dirty="0"/>
+              <a:t>1/ In </a:t>
+            </a:r>
+            <a:r>
+              <a:rPr lang="en-GB" b="1" dirty="0"/>
+              <a:t>animation_Character_Select.js</a:t>
+            </a:r>
+          </a:p>
+        </p:txBody>
+      </p:sp>
+    </p:spTree>
+    <p:extLst>
+      <p:ext uri="{BB962C8B-B14F-4D97-AF65-F5344CB8AC3E}">
+        <p14:creationId xmlns:p14="http://schemas.microsoft.com/office/powerpoint/2010/main" val="3631654728"/>
+      </p:ext>
+    </p:extLst>
+  </p:cSld>
+  <p:clrMapOvr>
+    <a:masterClrMapping/>
+  </p:clrMapOvr>
+</p:sld>
+</file>
+
 <file path=ppt/theme/theme1.xml><?xml version="1.0" encoding="utf-8"?>
 <a:theme xmlns:a="http://schemas.openxmlformats.org/drawingml/2006/main" name="Office Theme">
   <a:themeElements>

</xml_diff>

<commit_message>
Add class Effect for impact effect
</commit_message>
<xml_diff>
--- a/Document/GAME_DOC.pptx
+++ b/Document/GAME_DOC.pptx
@@ -4774,12 +4774,16 @@
               <a:t>EVENT HANDLING </a:t>
             </a:r>
             <a:r>
-              <a:rPr lang="en-GB" dirty="0"/>
+              <a:rPr lang="en-GB"/>
               <a:t>in </a:t>
             </a:r>
             <a:r>
+              <a:rPr lang="en-GB" b="1"/>
+              <a:t>eventHandling.</a:t>
+            </a:r>
+            <a:r>
               <a:rPr lang="en-GB" b="1" dirty="0"/>
-              <a:t>animation.js</a:t>
+              <a:t>js</a:t>
             </a:r>
           </a:p>
           <a:p>

</xml_diff>